<commit_message>
k-means returns vals now
</commit_message>
<xml_diff>
--- a/presentation.pptx
+++ b/presentation.pptx
@@ -8345,6 +8345,24 @@
               <a:rPr lang="en-US" dirty="0"/>
               <a:t>This was beyond the scope of our abilities for this project, in terms of both time and computing power</a:t>
             </a:r>
+          </a:p>
+          <a:p>
+            <a:r>
+              <a:rPr lang="en-US" dirty="0"/>
+              <a:t>Previous work has been done on ”sentiment analysis” – this would be THE most promising technique to accomplish what we want to accomplish</a:t>
+            </a:r>
+          </a:p>
+          <a:p>
+            <a:pPr lvl="1"/>
+            <a:r>
+              <a:rPr lang="en-US" dirty="0"/>
+              <a:t>Makes heavy use of text analysis and natural </a:t>
+            </a:r>
+            <a:r>
+              <a:rPr lang="en-US"/>
+              <a:t>language processing</a:t>
+            </a:r>
+            <a:endParaRPr lang="en-US" dirty="0"/>
           </a:p>
           <a:p>
             <a:endParaRPr lang="en-US" dirty="0"/>

</xml_diff>